<commit_message>
Numbered figures in report
</commit_message>
<xml_diff>
--- a/Documentation/Presentation_final_PSO_Pyteam.pptx
+++ b/Documentation/Presentation_final_PSO_Pyteam.pptx
@@ -123,7 +123,7 @@
   </p:defaultTextStyle>
   <p:extLst>
     <p:ext uri="{EFAFB233-063F-42B5-8137-9DF3F51BA10A}">
-      <p15:sldGuideLst xmlns:p15="http://schemas.microsoft.com/office/powerpoint/2012/main" xmlns="">
+      <p15:sldGuideLst xmlns="" xmlns:p15="http://schemas.microsoft.com/office/powerpoint/2012/main">
         <p15:guide id="1" orient="horz" pos="2160">
           <p15:clr>
             <a:srgbClr val="A4A3A4"/>
@@ -5469,11 +5469,11 @@
             </a:r>
             <a:r>
               <a:rPr lang="en-US" sz="2400" b="1" dirty="0" smtClean="0"/>
-              <a:t>-axis = time (</a:t>
-            </a:r>
-            <a:r>
-              <a:rPr lang="en-US" sz="2400" b="1" dirty="0" err="1" smtClean="0"/>
-              <a:t>ms</a:t>
+              <a:t>-axis = time </a:t>
+            </a:r>
+            <a:r>
+              <a:rPr lang="en-US" sz="2400" b="1" dirty="0" smtClean="0"/>
+              <a:t>(s</a:t>
             </a:r>
             <a:r>
               <a:rPr lang="en-US" sz="2400" b="1" dirty="0" smtClean="0"/>
@@ -5657,11 +5657,15 @@
             </a:r>
             <a:r>
               <a:rPr lang="en-US" sz="2400" b="1" dirty="0" smtClean="0"/>
-              <a:t>-axis = time (</a:t>
-            </a:r>
-            <a:r>
-              <a:rPr lang="en-US" sz="2400" b="1" dirty="0" err="1" smtClean="0"/>
-              <a:t>ms</a:t>
+              <a:t>-axis = </a:t>
+            </a:r>
+            <a:r>
+              <a:rPr lang="en-US" sz="2400" b="1" smtClean="0"/>
+              <a:t>time </a:t>
+            </a:r>
+            <a:r>
+              <a:rPr lang="en-US" sz="2400" b="1" smtClean="0"/>
+              <a:t>(s</a:t>
             </a:r>
             <a:r>
               <a:rPr lang="en-US" sz="2400" b="1" dirty="0" smtClean="0"/>

</xml_diff>